<commit_message>
Revised some presentation 0 bits
</commit_message>
<xml_diff>
--- a/Lesson0_Expressions/Lesson0_Expressions.pptx
+++ b/Lesson0_Expressions/Lesson0_Expressions.pptx
@@ -233,7 +233,7 @@
           <a:p>
             <a:fld id="{C78DEE89-1C10-4A7A-B2C0-183D94ABC59D}" type="datetimeFigureOut">
               <a:rPr lang="en-US" smtClean="0"/>
-              <a:t>9/8/2015</a:t>
+              <a:t>9/9/2015</a:t>
             </a:fld>
             <a:endParaRPr lang="en-US"/>
           </a:p>
@@ -1644,15 +1644,17 @@
           </a:p>
           <a:p>
             <a:r>
+              <a:rPr lang="en-US" smtClean="0"/>
+              <a:t>true</a:t>
+            </a:r>
+            <a:endParaRPr lang="en-US" dirty="0" smtClean="0"/>
+          </a:p>
+          <a:p>
+            <a:r>
               <a:rPr lang="en-US" dirty="0" smtClean="0"/>
               <a:t>false</a:t>
             </a:r>
-          </a:p>
-          <a:p>
-            <a:r>
-              <a:rPr lang="en-US" dirty="0" smtClean="0"/>
-              <a:t>true</a:t>
-            </a:r>
+            <a:endParaRPr lang="en-US" dirty="0" smtClean="0"/>
           </a:p>
           <a:p>
             <a:r>
@@ -2805,7 +2807,7 @@
           <a:p>
             <a:fld id="{A0665B8D-F36E-44C1-9E17-7FE8E7098B0A}" type="datetimeFigureOut">
               <a:rPr lang="en-US" smtClean="0"/>
-              <a:t>9/8/2015</a:t>
+              <a:t>9/9/2015</a:t>
             </a:fld>
             <a:endParaRPr lang="en-US"/>
           </a:p>
@@ -2901,6 +2903,9 @@
   <p:clrMapOvr>
     <a:masterClrMapping/>
   </p:clrMapOvr>
+  <p:transition>
+    <p:push/>
+  </p:transition>
 </p:sldLayout>
 </file>
 
@@ -3013,7 +3018,7 @@
           <a:p>
             <a:fld id="{A0665B8D-F36E-44C1-9E17-7FE8E7098B0A}" type="datetimeFigureOut">
               <a:rPr lang="en-US" smtClean="0"/>
-              <a:t>9/8/2015</a:t>
+              <a:t>9/9/2015</a:t>
             </a:fld>
             <a:endParaRPr lang="en-US"/>
           </a:p>
@@ -3071,6 +3076,9 @@
   <p:clrMapOvr>
     <a:masterClrMapping/>
   </p:clrMapOvr>
+  <p:transition>
+    <p:push/>
+  </p:transition>
 </p:sldLayout>
 </file>
 
@@ -3269,7 +3277,7 @@
           <a:p>
             <a:fld id="{A0665B8D-F36E-44C1-9E17-7FE8E7098B0A}" type="datetimeFigureOut">
               <a:rPr lang="en-US" smtClean="0"/>
-              <a:t>9/8/2015</a:t>
+              <a:t>9/9/2015</a:t>
             </a:fld>
             <a:endParaRPr lang="en-US"/>
           </a:p>
@@ -3327,6 +3335,9 @@
   <p:clrMapOvr>
     <a:masterClrMapping/>
   </p:clrMapOvr>
+  <p:transition>
+    <p:push/>
+  </p:transition>
 </p:sldLayout>
 </file>
 
@@ -3443,7 +3454,7 @@
           <a:p>
             <a:fld id="{A0665B8D-F36E-44C1-9E17-7FE8E7098B0A}" type="datetimeFigureOut">
               <a:rPr lang="en-US" smtClean="0"/>
-              <a:t>9/8/2015</a:t>
+              <a:t>9/9/2015</a:t>
             </a:fld>
             <a:endParaRPr lang="en-US"/>
           </a:p>
@@ -3501,6 +3512,9 @@
   <p:clrMapOvr>
     <a:masterClrMapping/>
   </p:clrMapOvr>
+  <p:transition>
+    <p:push/>
+  </p:transition>
 </p:sldLayout>
 </file>
 
@@ -3786,7 +3800,7 @@
           <a:p>
             <a:fld id="{A0665B8D-F36E-44C1-9E17-7FE8E7098B0A}" type="datetimeFigureOut">
               <a:rPr lang="en-US" smtClean="0"/>
-              <a:t>9/8/2015</a:t>
+              <a:t>9/9/2015</a:t>
             </a:fld>
             <a:endParaRPr lang="en-US"/>
           </a:p>
@@ -3882,6 +3896,9 @@
   <p:clrMapOvr>
     <a:masterClrMapping/>
   </p:clrMapOvr>
+  <p:transition>
+    <p:push/>
+  </p:transition>
 </p:sldLayout>
 </file>
 
@@ -4061,7 +4078,7 @@
           <a:p>
             <a:fld id="{A0665B8D-F36E-44C1-9E17-7FE8E7098B0A}" type="datetimeFigureOut">
               <a:rPr lang="en-US" smtClean="0"/>
-              <a:t>9/8/2015</a:t>
+              <a:t>9/9/2015</a:t>
             </a:fld>
             <a:endParaRPr lang="en-US"/>
           </a:p>
@@ -4119,6 +4136,9 @@
   <p:clrMapOvr>
     <a:masterClrMapping/>
   </p:clrMapOvr>
+  <p:transition>
+    <p:push/>
+  </p:transition>
 </p:sldLayout>
 </file>
 
@@ -4440,7 +4460,7 @@
           <a:p>
             <a:fld id="{A0665B8D-F36E-44C1-9E17-7FE8E7098B0A}" type="datetimeFigureOut">
               <a:rPr lang="en-US" smtClean="0"/>
-              <a:t>9/8/2015</a:t>
+              <a:t>9/9/2015</a:t>
             </a:fld>
             <a:endParaRPr lang="en-US"/>
           </a:p>
@@ -4498,6 +4518,9 @@
   <p:clrMapOvr>
     <a:masterClrMapping/>
   </p:clrMapOvr>
+  <p:transition>
+    <p:push/>
+  </p:transition>
 </p:sldLayout>
 </file>
 
@@ -4558,7 +4581,7 @@
           <a:p>
             <a:fld id="{A0665B8D-F36E-44C1-9E17-7FE8E7098B0A}" type="datetimeFigureOut">
               <a:rPr lang="en-US" smtClean="0"/>
-              <a:t>9/8/2015</a:t>
+              <a:t>9/9/2015</a:t>
             </a:fld>
             <a:endParaRPr lang="en-US"/>
           </a:p>
@@ -4616,6 +4639,9 @@
   <p:clrMapOvr>
     <a:masterClrMapping/>
   </p:clrMapOvr>
+  <p:transition>
+    <p:push/>
+  </p:transition>
 </p:sldLayout>
 </file>
 
@@ -4729,7 +4755,7 @@
           <a:p>
             <a:fld id="{A0665B8D-F36E-44C1-9E17-7FE8E7098B0A}" type="datetimeFigureOut">
               <a:rPr lang="en-US" smtClean="0"/>
-              <a:t>9/8/2015</a:t>
+              <a:t>9/9/2015</a:t>
             </a:fld>
             <a:endParaRPr lang="en-US"/>
           </a:p>
@@ -4795,6 +4821,9 @@
   <p:clrMapOvr>
     <a:masterClrMapping/>
   </p:clrMapOvr>
+  <p:transition>
+    <p:push/>
+  </p:transition>
 </p:sldLayout>
 </file>
 
@@ -5083,7 +5112,7 @@
           <a:p>
             <a:fld id="{A0665B8D-F36E-44C1-9E17-7FE8E7098B0A}" type="datetimeFigureOut">
               <a:rPr lang="en-US" smtClean="0"/>
-              <a:t>9/8/2015</a:t>
+              <a:t>9/9/2015</a:t>
             </a:fld>
             <a:endParaRPr lang="en-US"/>
           </a:p>
@@ -5162,6 +5191,9 @@
   <p:clrMapOvr>
     <a:masterClrMapping/>
   </p:clrMapOvr>
+  <p:transition>
+    <p:push/>
+  </p:transition>
 </p:sldLayout>
 </file>
 
@@ -5465,7 +5497,7 @@
           <a:p>
             <a:fld id="{A0665B8D-F36E-44C1-9E17-7FE8E7098B0A}" type="datetimeFigureOut">
               <a:rPr lang="en-US" smtClean="0"/>
-              <a:t>9/8/2015</a:t>
+              <a:t>9/9/2015</a:t>
             </a:fld>
             <a:endParaRPr lang="en-US"/>
           </a:p>
@@ -5523,6 +5555,9 @@
   <p:clrMapOvr>
     <a:masterClrMapping/>
   </p:clrMapOvr>
+  <p:transition>
+    <p:push/>
+  </p:transition>
 </p:sldLayout>
 </file>
 
@@ -5752,7 +5787,7 @@
           <a:p>
             <a:fld id="{A0665B8D-F36E-44C1-9E17-7FE8E7098B0A}" type="datetimeFigureOut">
               <a:rPr lang="en-US" smtClean="0"/>
-              <a:t>9/8/2015</a:t>
+              <a:t>9/9/2015</a:t>
             </a:fld>
             <a:endParaRPr lang="en-US"/>
           </a:p>
@@ -5891,6 +5926,9 @@
     <p:sldLayoutId id="2147483682" r:id="rId10"/>
     <p:sldLayoutId id="2147483683" r:id="rId11"/>
   </p:sldLayoutIdLst>
+  <p:transition>
+    <p:push/>
+  </p:transition>
   <p:txStyles>
     <p:titleStyle>
       <a:lvl1pPr algn="l" defTabSz="914400" rtl="0" eaLnBrk="1" latinLnBrk="0" hangingPunct="1">
@@ -6321,16 +6359,22 @@
             </a:r>
             <a:r>
               <a:rPr lang="en-US" sz="3200" dirty="0" smtClean="0"/>
-              <a:t>in: </a:t>
+              <a:t>in! </a:t>
             </a:r>
             <a:r>
               <a:rPr lang="en-US" sz="3200" dirty="0">
+                <a:solidFill>
+                  <a:schemeClr val="accent2"/>
+                </a:solidFill>
                 <a:latin typeface="Consolas" panose="020B0609020204030204" pitchFamily="49" charset="0"/>
                 <a:cs typeface="Consolas" panose="020B0609020204030204" pitchFamily="49" charset="0"/>
               </a:rPr>
               <a:t>http://bit.ly/1K5Xsbs</a:t>
             </a:r>
             <a:endParaRPr lang="en-US" sz="3600" dirty="0">
+              <a:solidFill>
+                <a:schemeClr val="accent2"/>
+              </a:solidFill>
               <a:latin typeface="Consolas" panose="020B0609020204030204" pitchFamily="49" charset="0"/>
               <a:cs typeface="Consolas" panose="020B0609020204030204" pitchFamily="49" charset="0"/>
             </a:endParaRPr>
@@ -6377,6 +6421,9 @@
   <p:clrMapOvr>
     <a:masterClrMapping/>
   </p:clrMapOvr>
+  <p:transition>
+    <p:push/>
+  </p:transition>
   <p:timing>
     <p:tnLst>
       <p:par>
@@ -6552,6 +6599,9 @@
   <p:clrMapOvr>
     <a:masterClrMapping/>
   </p:clrMapOvr>
+  <p:transition>
+    <p:push/>
+  </p:transition>
   <p:timing>
     <p:tnLst>
       <p:par>
@@ -6893,6 +6943,9 @@
   <p:clrMapOvr>
     <a:masterClrMapping/>
   </p:clrMapOvr>
+  <p:transition>
+    <p:push/>
+  </p:transition>
   <p:timing>
     <p:tnLst>
       <p:par>
@@ -7166,6 +7219,9 @@
   <p:clrMapOvr>
     <a:masterClrMapping/>
   </p:clrMapOvr>
+  <p:transition>
+    <p:push/>
+  </p:transition>
   <p:timing>
     <p:tnLst>
       <p:par>
@@ -7494,6 +7550,16 @@
   <p:clrMapOvr>
     <a:masterClrMapping/>
   </p:clrMapOvr>
+  <p:transition>
+    <p:push/>
+  </p:transition>
+  <p:timing>
+    <p:tnLst>
+      <p:par>
+        <p:cTn id="1" dur="indefinite" restart="never" nodeType="tmRoot"/>
+      </p:par>
+    </p:tnLst>
+  </p:timing>
 </p:sld>
 </file>
 
@@ -8118,6 +8184,16 @@
   <p:clrMapOvr>
     <a:masterClrMapping/>
   </p:clrMapOvr>
+  <p:transition>
+    <p:push/>
+  </p:transition>
+  <p:timing>
+    <p:tnLst>
+      <p:par>
+        <p:cTn id="1" dur="indefinite" restart="never" nodeType="tmRoot"/>
+      </p:par>
+    </p:tnLst>
+  </p:timing>
 </p:sld>
 </file>
 
@@ -8457,6 +8533,16 @@
   <p:clrMapOvr>
     <a:masterClrMapping/>
   </p:clrMapOvr>
+  <p:transition>
+    <p:push/>
+  </p:transition>
+  <p:timing>
+    <p:tnLst>
+      <p:par>
+        <p:cTn id="1" dur="indefinite" restart="never" nodeType="tmRoot"/>
+      </p:par>
+    </p:tnLst>
+  </p:timing>
 </p:sld>
 </file>
 
@@ -8581,7 +8667,21 @@
                 <a:latin typeface="Consolas" panose="020B0609020204030204" pitchFamily="49" charset="0"/>
                 <a:cs typeface="Consolas" panose="020B0609020204030204" pitchFamily="49" charset="0"/>
               </a:rPr>
-              <a:t>false =&gt; true</a:t>
+              <a:t>false =&gt; </a:t>
+            </a:r>
+            <a:r>
+              <a:rPr lang="en-US" sz="2800" dirty="0" smtClean="0">
+                <a:latin typeface="Consolas" panose="020B0609020204030204" pitchFamily="49" charset="0"/>
+                <a:cs typeface="Consolas" panose="020B0609020204030204" pitchFamily="49" charset="0"/>
+              </a:rPr>
+              <a:t>false</a:t>
+            </a:r>
+            <a:r>
+              <a:rPr lang="en-US" sz="2800" dirty="0" smtClean="0">
+                <a:latin typeface="Consolas" panose="020B0609020204030204" pitchFamily="49" charset="0"/>
+                <a:cs typeface="Consolas" panose="020B0609020204030204" pitchFamily="49" charset="0"/>
+              </a:rPr>
+              <a:t/>
             </a:r>
             <a:br>
               <a:rPr lang="en-US" sz="2800" dirty="0" smtClean="0">
@@ -8687,6 +8787,16 @@
   <p:clrMapOvr>
     <a:masterClrMapping/>
   </p:clrMapOvr>
+  <p:transition>
+    <p:push/>
+  </p:transition>
+  <p:timing>
+    <p:tnLst>
+      <p:par>
+        <p:cTn id="1" dur="indefinite" restart="never" nodeType="tmRoot"/>
+      </p:par>
+    </p:tnLst>
+  </p:timing>
 </p:sld>
 </file>
 
@@ -8879,7 +8989,7 @@
                 </a:solidFill>
                 <a:cs typeface="Consolas" panose="020B0609020204030204" pitchFamily="49" charset="0"/>
               </a:rPr>
-              <a:t>Advanced: There's also bitwise AND, OR, NOT, and XOR.</a:t>
+              <a:t>Advanced: There's also bitwise AND, OR, NOT, and XOR. Use them with numbers.</a:t>
             </a:r>
             <a:endParaRPr lang="en-US" sz="2800" i="1" dirty="0" smtClean="0">
               <a:solidFill>
@@ -9011,6 +9121,16 @@
   <p:clrMapOvr>
     <a:masterClrMapping/>
   </p:clrMapOvr>
+  <p:transition>
+    <p:push/>
+  </p:transition>
+  <p:timing>
+    <p:tnLst>
+      <p:par>
+        <p:cTn id="1" dur="indefinite" restart="never" nodeType="tmRoot"/>
+      </p:par>
+    </p:tnLst>
+  </p:timing>
 </p:sld>
 </file>
 
@@ -9250,6 +9370,16 @@
   <p:clrMapOvr>
     <a:masterClrMapping/>
   </p:clrMapOvr>
+  <p:transition>
+    <p:push/>
+  </p:transition>
+  <p:timing>
+    <p:tnLst>
+      <p:par>
+        <p:cTn id="1" dur="indefinite" restart="never" nodeType="tmRoot"/>
+      </p:par>
+    </p:tnLst>
+  </p:timing>
 </p:sld>
 </file>
 
@@ -9315,7 +9445,7 @@
         </p:spPr>
         <p:txBody>
           <a:bodyPr>
-            <a:normAutofit fontScale="85000" lnSpcReduction="20000"/>
+            <a:normAutofit fontScale="92500" lnSpcReduction="10000"/>
           </a:bodyPr>
           <a:lstStyle/>
           <a:p>
@@ -9341,10 +9471,11 @@
             </a:r>
             <a:r>
               <a:rPr lang="en-US" sz="2800" dirty="0" smtClean="0"/>
-              <a:t>", which dictates how they evaluate with logical operators. </a:t>
-            </a:r>
-          </a:p>
-          <a:p>
+              <a:t>".</a:t>
+            </a:r>
+            <a:br>
+              <a:rPr lang="en-US" sz="2800" dirty="0" smtClean="0"/>
+            </a:br>
             <a:r>
               <a:rPr lang="en-US" sz="2800" dirty="0" smtClean="0"/>
               <a:t>The rules, for what we've covered so far, are simple:</a:t>
@@ -9360,11 +9491,11 @@
                 <a:latin typeface="Consolas" panose="020B0609020204030204" pitchFamily="49" charset="0"/>
                 <a:cs typeface="Consolas" panose="020B0609020204030204" pitchFamily="49" charset="0"/>
               </a:rPr>
-              <a:t>0</a:t>
+              <a:t>0 and NaN</a:t>
             </a:r>
             <a:r>
               <a:rPr lang="en-US" sz="2600" dirty="0" smtClean="0"/>
-              <a:t> is </a:t>
+              <a:t> are </a:t>
             </a:r>
             <a:r>
               <a:rPr lang="en-US" sz="2600" dirty="0" err="1" smtClean="0"/>
@@ -9382,7 +9513,7 @@
             </a:pPr>
             <a:r>
               <a:rPr lang="en-US" sz="2600" dirty="0" smtClean="0"/>
-              <a:t>NaN is </a:t>
+              <a:t>"" is </a:t>
             </a:r>
             <a:r>
               <a:rPr lang="en-US" sz="2600" dirty="0" err="1" smtClean="0"/>
@@ -9400,24 +9531,6 @@
             </a:pPr>
             <a:r>
               <a:rPr lang="en-US" sz="2600" dirty="0" smtClean="0"/>
-              <a:t>"" is </a:t>
-            </a:r>
-            <a:r>
-              <a:rPr lang="en-US" sz="2600" dirty="0" err="1" smtClean="0"/>
-              <a:t>falsy</a:t>
-            </a:r>
-            <a:r>
-              <a:rPr lang="en-US" sz="2600" dirty="0" smtClean="0"/>
-              <a:t>.</a:t>
-            </a:r>
-          </a:p>
-          <a:p>
-            <a:pPr lvl="1">
-              <a:buFont typeface="Arial" panose="020B0604020202020204" pitchFamily="34" charset="0"/>
-              <a:buChar char="•"/>
-            </a:pPr>
-            <a:r>
-              <a:rPr lang="en-US" sz="2600" dirty="0" smtClean="0"/>
               <a:t>All other Numbers and </a:t>
             </a:r>
             <a:r>
@@ -9447,8 +9560,19 @@
                 <a:latin typeface="Consolas" panose="020B0609020204030204" pitchFamily="49" charset="0"/>
                 <a:cs typeface="Consolas" panose="020B0609020204030204" pitchFamily="49" charset="0"/>
               </a:rPr>
-              <a:t>!!0 =&gt; true</a:t>
-            </a:r>
+              <a:t>!!0 =&gt; </a:t>
+            </a:r>
+            <a:r>
+              <a:rPr lang="en-US" sz="2800" dirty="0" smtClean="0">
+                <a:latin typeface="Consolas" panose="020B0609020204030204" pitchFamily="49" charset="0"/>
+                <a:cs typeface="Consolas" panose="020B0609020204030204" pitchFamily="49" charset="0"/>
+              </a:rPr>
+              <a:t>false</a:t>
+            </a:r>
+            <a:endParaRPr lang="en-US" sz="2800" dirty="0" smtClean="0">
+              <a:latin typeface="Consolas" panose="020B0609020204030204" pitchFamily="49" charset="0"/>
+              <a:cs typeface="Consolas" panose="020B0609020204030204" pitchFamily="49" charset="0"/>
+            </a:endParaRPr>
           </a:p>
           <a:p>
             <a:pPr>
@@ -9567,6 +9691,16 @@
   <p:clrMapOvr>
     <a:masterClrMapping/>
   </p:clrMapOvr>
+  <p:transition>
+    <p:push/>
+  </p:transition>
+  <p:timing>
+    <p:tnLst>
+      <p:par>
+        <p:cTn id="1" dur="indefinite" restart="never" nodeType="tmRoot"/>
+      </p:par>
+    </p:tnLst>
+  </p:timing>
 </p:sld>
 </file>
 
@@ -9689,6 +9823,16 @@
   <p:clrMapOvr>
     <a:masterClrMapping/>
   </p:clrMapOvr>
+  <p:transition>
+    <p:push/>
+  </p:transition>
+  <p:timing>
+    <p:tnLst>
+      <p:par>
+        <p:cTn id="1" dur="indefinite" restart="never" nodeType="tmRoot"/>
+      </p:par>
+    </p:tnLst>
+  </p:timing>
 </p:sld>
 </file>
 
@@ -9921,6 +10065,16 @@
   <p:clrMapOvr>
     <a:masterClrMapping/>
   </p:clrMapOvr>
+  <p:transition>
+    <p:push/>
+  </p:transition>
+  <p:timing>
+    <p:tnLst>
+      <p:par>
+        <p:cTn id="1" dur="indefinite" restart="never" nodeType="tmRoot"/>
+      </p:par>
+    </p:tnLst>
+  </p:timing>
 </p:sld>
 </file>
 
@@ -10005,7 +10159,15 @@
             </a:r>
             <a:r>
               <a:rPr lang="en-US" sz="2800" dirty="0" smtClean="0"/>
-              <a:t>		(equality after type conversion)</a:t>
+              <a:t>		(equality after type conversion</a:t>
+            </a:r>
+            <a:r>
+              <a:rPr lang="en-US" sz="2800" dirty="0"/>
+              <a:t>),			!=	(not equal</a:t>
+            </a:r>
+            <a:r>
+              <a:rPr lang="en-US" sz="2800" dirty="0" smtClean="0"/>
+              <a:t>)</a:t>
             </a:r>
           </a:p>
           <a:p>
@@ -10022,7 +10184,15 @@
             </a:r>
             <a:r>
               <a:rPr lang="en-US" sz="2800" dirty="0" smtClean="0"/>
-              <a:t>		(strict equality, no type conversion, "identical")</a:t>
+              <a:t>		(strict equality, no type conversion, "identical"),</a:t>
+            </a:r>
+            <a:r>
+              <a:rPr lang="en-US" sz="2800" dirty="0"/>
+              <a:t>	!==	(not identical</a:t>
+            </a:r>
+            <a:r>
+              <a:rPr lang="en-US" sz="2800" dirty="0" smtClean="0"/>
+              <a:t>)</a:t>
             </a:r>
             <a:br>
               <a:rPr lang="en-US" sz="2800" dirty="0" smtClean="0"/>
@@ -10105,19 +10275,8 @@
                 <a:latin typeface="Consolas" panose="020B0609020204030204" pitchFamily="49" charset="0"/>
                 <a:cs typeface="Consolas" panose="020B0609020204030204" pitchFamily="49" charset="0"/>
               </a:rPr>
-              <a:t>"999" !== 999 </a:t>
-            </a:r>
-            <a:r>
-              <a:rPr lang="en-US" sz="2800" smtClean="0">
-                <a:latin typeface="Consolas" panose="020B0609020204030204" pitchFamily="49" charset="0"/>
-                <a:cs typeface="Consolas" panose="020B0609020204030204" pitchFamily="49" charset="0"/>
-              </a:rPr>
-              <a:t>=&gt; true</a:t>
-            </a:r>
-            <a:endParaRPr lang="en-US" sz="2800" dirty="0" smtClean="0">
-              <a:latin typeface="Consolas" panose="020B0609020204030204" pitchFamily="49" charset="0"/>
-              <a:cs typeface="Consolas" panose="020B0609020204030204" pitchFamily="49" charset="0"/>
-            </a:endParaRPr>
+              <a:t>"999" !== 999 =&gt; true</a:t>
+            </a:r>
           </a:p>
         </p:txBody>
       </p:sp>
@@ -10131,6 +10290,16 @@
   <p:clrMapOvr>
     <a:masterClrMapping/>
   </p:clrMapOvr>
+  <p:transition>
+    <p:push/>
+  </p:transition>
+  <p:timing>
+    <p:tnLst>
+      <p:par>
+        <p:cTn id="1" dur="indefinite" restart="never" nodeType="tmRoot"/>
+      </p:par>
+    </p:tnLst>
+  </p:timing>
 </p:sld>
 </file>
 
@@ -10283,8 +10452,19 @@
                 <a:latin typeface="Consolas" panose="020B0609020204030204" pitchFamily="49" charset="0"/>
                 <a:cs typeface="Consolas" panose="020B0609020204030204" pitchFamily="49" charset="0"/>
               </a:rPr>
-              <a:t>-1 &lt;= 82 =&gt; false</a:t>
-            </a:r>
+              <a:t>-1 &lt;= 82 =&gt; </a:t>
+            </a:r>
+            <a:r>
+              <a:rPr lang="en-US" sz="2400" dirty="0" smtClean="0">
+                <a:latin typeface="Consolas" panose="020B0609020204030204" pitchFamily="49" charset="0"/>
+                <a:cs typeface="Consolas" panose="020B0609020204030204" pitchFamily="49" charset="0"/>
+              </a:rPr>
+              <a:t>true</a:t>
+            </a:r>
+            <a:endParaRPr lang="en-US" sz="2400" dirty="0" smtClean="0">
+              <a:latin typeface="Consolas" panose="020B0609020204030204" pitchFamily="49" charset="0"/>
+              <a:cs typeface="Consolas" panose="020B0609020204030204" pitchFamily="49" charset="0"/>
+            </a:endParaRPr>
           </a:p>
           <a:p>
             <a:pPr>
@@ -10313,7 +10493,7 @@
         </p:nvSpPr>
         <p:spPr>
           <a:xfrm>
-            <a:off x="7274560" y="4683760"/>
+            <a:off x="7274560" y="4823280"/>
             <a:ext cx="4236720" cy="1200329"/>
           </a:xfrm>
           <a:prstGeom prst="rect">
@@ -10357,6 +10537,16 @@
   <p:clrMapOvr>
     <a:masterClrMapping/>
   </p:clrMapOvr>
+  <p:transition>
+    <p:push/>
+  </p:transition>
+  <p:timing>
+    <p:tnLst>
+      <p:par>
+        <p:cTn id="1" dur="indefinite" restart="never" nodeType="tmRoot"/>
+      </p:par>
+    </p:tnLst>
+  </p:timing>
 </p:sld>
 </file>
 
@@ -10558,6 +10748,16 @@
   <p:clrMapOvr>
     <a:masterClrMapping/>
   </p:clrMapOvr>
+  <p:transition>
+    <p:push/>
+  </p:transition>
+  <p:timing>
+    <p:tnLst>
+      <p:par>
+        <p:cTn id="1" dur="indefinite" restart="never" nodeType="tmRoot"/>
+      </p:par>
+    </p:tnLst>
+  </p:timing>
 </p:sld>
 </file>
 
@@ -10778,6 +10978,16 @@
   <p:clrMapOvr>
     <a:masterClrMapping/>
   </p:clrMapOvr>
+  <p:transition>
+    <p:push/>
+  </p:transition>
+  <p:timing>
+    <p:tnLst>
+      <p:par>
+        <p:cTn id="1" dur="indefinite" restart="never" nodeType="tmRoot"/>
+      </p:par>
+    </p:tnLst>
+  </p:timing>
 </p:sld>
 </file>
 
@@ -10910,6 +11120,16 @@
   <p:clrMapOvr>
     <a:masterClrMapping/>
   </p:clrMapOvr>
+  <p:transition>
+    <p:push/>
+  </p:transition>
+  <p:timing>
+    <p:tnLst>
+      <p:par>
+        <p:cTn id="1" dur="indefinite" restart="never" nodeType="tmRoot"/>
+      </p:par>
+    </p:tnLst>
+  </p:timing>
 </p:sld>
 </file>
 
@@ -11033,6 +11253,9 @@
   <p:clrMapOvr>
     <a:masterClrMapping/>
   </p:clrMapOvr>
+  <p:transition>
+    <p:push/>
+  </p:transition>
   <p:timing>
     <p:tnLst>
       <p:par>
@@ -11172,6 +11395,9 @@
   <p:clrMapOvr>
     <a:masterClrMapping/>
   </p:clrMapOvr>
+  <p:transition>
+    <p:push/>
+  </p:transition>
   <p:timing>
     <p:tnLst>
       <p:par>
@@ -11535,6 +11761,16 @@
   <p:clrMapOvr>
     <a:masterClrMapping/>
   </p:clrMapOvr>
+  <p:transition>
+    <p:push/>
+  </p:transition>
+  <p:timing>
+    <p:tnLst>
+      <p:par>
+        <p:cTn id="1" dur="indefinite" restart="never" nodeType="tmRoot"/>
+      </p:par>
+    </p:tnLst>
+  </p:timing>
 </p:sld>
 </file>
 
@@ -11687,6 +11923,9 @@
   <p:clrMapOvr>
     <a:masterClrMapping/>
   </p:clrMapOvr>
+  <p:transition>
+    <p:push/>
+  </p:transition>
   <p:timing>
     <p:tnLst>
       <p:par>
@@ -11813,6 +12052,9 @@
   <p:clrMapOvr>
     <a:masterClrMapping/>
   </p:clrMapOvr>
+  <p:transition>
+    <p:push/>
+  </p:transition>
   <p:timing>
     <p:tnLst>
       <p:par>
@@ -11873,6 +12115,9 @@
   <p:clrMapOvr>
     <a:masterClrMapping/>
   </p:clrMapOvr>
+  <p:transition>
+    <p:push/>
+  </p:transition>
   <p:timing>
     <p:tnLst>
       <p:par>
@@ -12127,6 +12372,9 @@
   <p:clrMapOvr>
     <a:masterClrMapping/>
   </p:clrMapOvr>
+  <p:transition>
+    <p:push/>
+  </p:transition>
   <p:timing>
     <p:tnLst>
       <p:par>

</xml_diff>